<commit_message>
interim working for prediction model
</commit_message>
<xml_diff>
--- a/reports/Midterm Presentation.pptx
+++ b/reports/Midterm Presentation.pptx
@@ -4,6 +4,9 @@
   <p:sldMasterIdLst>
     <p:sldMasterId id="2147483648" r:id="rId1"/>
   </p:sldMasterIdLst>
+  <p:notesMasterIdLst>
+    <p:notesMasterId r:id="rId9"/>
+  </p:notesMasterIdLst>
   <p:sldIdLst>
     <p:sldId id="256" r:id="rId2"/>
     <p:sldId id="258" r:id="rId3"/>
@@ -110,6 +113,11 @@
       </a:defRPr>
     </a:lvl9pPr>
   </p:defaultTextStyle>
+  <p:extLst>
+    <p:ext uri="{EFAFB233-063F-42B5-8137-9DF3F51BA10A}">
+      <p15:sldGuideLst xmlns:p15="http://schemas.microsoft.com/office/powerpoint/2012/main"/>
+    </p:ext>
+  </p:extLst>
 </p:presentation>
 </file>
 
@@ -4002,7 +4010,7 @@
   <dgm:whole/>
   <dgm:extLst>
     <a:ext uri="http://schemas.microsoft.com/office/drawing/2008/diagram">
-      <dsp:dataModelExt xmlns:dsp="http://schemas.microsoft.com/office/drawing/2008/diagram" relId="rId6" minVer="http://schemas.openxmlformats.org/drawingml/2006/diagram"/>
+      <dsp:dataModelExt xmlns:dsp="http://schemas.microsoft.com/office/drawing/2008/diagram" relId="rId7" minVer="http://schemas.openxmlformats.org/drawingml/2006/diagram"/>
     </a:ext>
   </dgm:extLst>
 </dgm:dataModel>
@@ -4421,7 +4429,7 @@
   <dgm:whole/>
   <dgm:extLst>
     <a:ext uri="http://schemas.microsoft.com/office/drawing/2008/diagram">
-      <dsp:dataModelExt xmlns:dsp="http://schemas.microsoft.com/office/drawing/2008/diagram" relId="rId6" minVer="http://schemas.openxmlformats.org/drawingml/2006/diagram"/>
+      <dsp:dataModelExt xmlns:dsp="http://schemas.microsoft.com/office/drawing/2008/diagram" relId="rId7" minVer="http://schemas.openxmlformats.org/drawingml/2006/diagram"/>
     </a:ext>
   </dgm:extLst>
 </dgm:dataModel>
@@ -4840,7 +4848,7 @@
   <dgm:whole/>
   <dgm:extLst>
     <a:ext uri="http://schemas.microsoft.com/office/drawing/2008/diagram">
-      <dsp:dataModelExt xmlns:dsp="http://schemas.microsoft.com/office/drawing/2008/diagram" relId="rId6" minVer="http://schemas.openxmlformats.org/drawingml/2006/diagram"/>
+      <dsp:dataModelExt xmlns:dsp="http://schemas.microsoft.com/office/drawing/2008/diagram" relId="rId7" minVer="http://schemas.openxmlformats.org/drawingml/2006/diagram"/>
     </a:ext>
   </dgm:extLst>
 </dgm:dataModel>
@@ -5259,7 +5267,7 @@
   <dgm:whole/>
   <dgm:extLst>
     <a:ext uri="http://schemas.microsoft.com/office/drawing/2008/diagram">
-      <dsp:dataModelExt xmlns:dsp="http://schemas.microsoft.com/office/drawing/2008/diagram" relId="rId6" minVer="http://schemas.openxmlformats.org/drawingml/2006/diagram"/>
+      <dsp:dataModelExt xmlns:dsp="http://schemas.microsoft.com/office/drawing/2008/diagram" relId="rId7" minVer="http://schemas.openxmlformats.org/drawingml/2006/diagram"/>
     </a:ext>
   </dgm:extLst>
 </dgm:dataModel>
@@ -14937,6 +14945,889 @@
 </dgm:styleDef>
 </file>
 
+<file path=ppt/notesMasters/notesMaster1.xml><?xml version="1.0" encoding="utf-8"?>
+<p:notesMaster xmlns:a="http://schemas.openxmlformats.org/drawingml/2006/main" xmlns:r="http://schemas.openxmlformats.org/officeDocument/2006/relationships" xmlns:p="http://schemas.openxmlformats.org/presentationml/2006/main">
+  <p:cSld>
+    <p:bg>
+      <p:bgRef idx="1001">
+        <a:schemeClr val="bg1"/>
+      </p:bgRef>
+    </p:bg>
+    <p:spTree>
+      <p:nvGrpSpPr>
+        <p:cNvPr id="1" name=""/>
+        <p:cNvGrpSpPr/>
+        <p:nvPr/>
+      </p:nvGrpSpPr>
+      <p:grpSpPr>
+        <a:xfrm>
+          <a:off x="0" y="0"/>
+          <a:ext cx="0" cy="0"/>
+          <a:chOff x="0" y="0"/>
+          <a:chExt cx="0" cy="0"/>
+        </a:xfrm>
+      </p:grpSpPr>
+      <p:sp>
+        <p:nvSpPr>
+          <p:cNvPr id="2" name="Header Placeholder 1"/>
+          <p:cNvSpPr>
+            <a:spLocks noGrp="1"/>
+          </p:cNvSpPr>
+          <p:nvPr>
+            <p:ph type="hdr" sz="quarter"/>
+          </p:nvPr>
+        </p:nvSpPr>
+        <p:spPr>
+          <a:xfrm>
+            <a:off x="0" y="0"/>
+            <a:ext cx="2971800" cy="458788"/>
+          </a:xfrm>
+          <a:prstGeom prst="rect">
+            <a:avLst/>
+          </a:prstGeom>
+        </p:spPr>
+        <p:txBody>
+          <a:bodyPr vert="horz" lIns="91440" tIns="45720" rIns="91440" bIns="45720" rtlCol="0"/>
+          <a:lstStyle>
+            <a:lvl1pPr algn="l">
+              <a:defRPr sz="1200"/>
+            </a:lvl1pPr>
+          </a:lstStyle>
+          <a:p>
+            <a:endParaRPr lang="en-US"/>
+          </a:p>
+        </p:txBody>
+      </p:sp>
+      <p:sp>
+        <p:nvSpPr>
+          <p:cNvPr id="3" name="Date Placeholder 2"/>
+          <p:cNvSpPr>
+            <a:spLocks noGrp="1"/>
+          </p:cNvSpPr>
+          <p:nvPr>
+            <p:ph type="dt" idx="1"/>
+          </p:nvPr>
+        </p:nvSpPr>
+        <p:spPr>
+          <a:xfrm>
+            <a:off x="3884613" y="0"/>
+            <a:ext cx="2971800" cy="458788"/>
+          </a:xfrm>
+          <a:prstGeom prst="rect">
+            <a:avLst/>
+          </a:prstGeom>
+        </p:spPr>
+        <p:txBody>
+          <a:bodyPr vert="horz" lIns="91440" tIns="45720" rIns="91440" bIns="45720" rtlCol="0"/>
+          <a:lstStyle>
+            <a:lvl1pPr algn="r">
+              <a:defRPr sz="1200"/>
+            </a:lvl1pPr>
+          </a:lstStyle>
+          <a:p>
+            <a:fld id="{20DC5F7E-300C-4A51-9380-A87A00198885}" type="datetimeFigureOut">
+              <a:rPr lang="en-US" smtClean="0"/>
+              <a:t>2024-10-14</a:t>
+            </a:fld>
+            <a:endParaRPr lang="en-US"/>
+          </a:p>
+        </p:txBody>
+      </p:sp>
+      <p:sp>
+        <p:nvSpPr>
+          <p:cNvPr id="4" name="Slide Image Placeholder 3"/>
+          <p:cNvSpPr>
+            <a:spLocks noGrp="1" noRot="1" noChangeAspect="1"/>
+          </p:cNvSpPr>
+          <p:nvPr>
+            <p:ph type="sldImg" idx="2"/>
+          </p:nvPr>
+        </p:nvSpPr>
+        <p:spPr>
+          <a:xfrm>
+            <a:off x="685800" y="1143000"/>
+            <a:ext cx="5486400" cy="3086100"/>
+          </a:xfrm>
+          <a:prstGeom prst="rect">
+            <a:avLst/>
+          </a:prstGeom>
+          <a:noFill/>
+          <a:ln w="12700">
+            <a:solidFill>
+              <a:prstClr val="black"/>
+            </a:solidFill>
+          </a:ln>
+        </p:spPr>
+        <p:txBody>
+          <a:bodyPr vert="horz" lIns="91440" tIns="45720" rIns="91440" bIns="45720" rtlCol="0" anchor="ctr"/>
+          <a:lstStyle/>
+          <a:p>
+            <a:endParaRPr lang="en-US"/>
+          </a:p>
+        </p:txBody>
+      </p:sp>
+      <p:sp>
+        <p:nvSpPr>
+          <p:cNvPr id="5" name="Notes Placeholder 4"/>
+          <p:cNvSpPr>
+            <a:spLocks noGrp="1"/>
+          </p:cNvSpPr>
+          <p:nvPr>
+            <p:ph type="body" sz="quarter" idx="3"/>
+          </p:nvPr>
+        </p:nvSpPr>
+        <p:spPr>
+          <a:xfrm>
+            <a:off x="685800" y="4400550"/>
+            <a:ext cx="5486400" cy="3600450"/>
+          </a:xfrm>
+          <a:prstGeom prst="rect">
+            <a:avLst/>
+          </a:prstGeom>
+        </p:spPr>
+        <p:txBody>
+          <a:bodyPr vert="horz" lIns="91440" tIns="45720" rIns="91440" bIns="45720" rtlCol="0"/>
+          <a:lstStyle/>
+          <a:p>
+            <a:pPr lvl="0"/>
+            <a:r>
+              <a:rPr lang="en-US"/>
+              <a:t>Click to edit Master text styles</a:t>
+            </a:r>
+          </a:p>
+          <a:p>
+            <a:pPr lvl="1"/>
+            <a:r>
+              <a:rPr lang="en-US"/>
+              <a:t>Second level</a:t>
+            </a:r>
+          </a:p>
+          <a:p>
+            <a:pPr lvl="2"/>
+            <a:r>
+              <a:rPr lang="en-US"/>
+              <a:t>Third level</a:t>
+            </a:r>
+          </a:p>
+          <a:p>
+            <a:pPr lvl="3"/>
+            <a:r>
+              <a:rPr lang="en-US"/>
+              <a:t>Fourth level</a:t>
+            </a:r>
+          </a:p>
+          <a:p>
+            <a:pPr lvl="4"/>
+            <a:r>
+              <a:rPr lang="en-US"/>
+              <a:t>Fifth level</a:t>
+            </a:r>
+          </a:p>
+        </p:txBody>
+      </p:sp>
+      <p:sp>
+        <p:nvSpPr>
+          <p:cNvPr id="6" name="Footer Placeholder 5"/>
+          <p:cNvSpPr>
+            <a:spLocks noGrp="1"/>
+          </p:cNvSpPr>
+          <p:nvPr>
+            <p:ph type="ftr" sz="quarter" idx="4"/>
+          </p:nvPr>
+        </p:nvSpPr>
+        <p:spPr>
+          <a:xfrm>
+            <a:off x="0" y="8685213"/>
+            <a:ext cx="2971800" cy="458787"/>
+          </a:xfrm>
+          <a:prstGeom prst="rect">
+            <a:avLst/>
+          </a:prstGeom>
+        </p:spPr>
+        <p:txBody>
+          <a:bodyPr vert="horz" lIns="91440" tIns="45720" rIns="91440" bIns="45720" rtlCol="0" anchor="b"/>
+          <a:lstStyle>
+            <a:lvl1pPr algn="l">
+              <a:defRPr sz="1200"/>
+            </a:lvl1pPr>
+          </a:lstStyle>
+          <a:p>
+            <a:endParaRPr lang="en-US"/>
+          </a:p>
+        </p:txBody>
+      </p:sp>
+      <p:sp>
+        <p:nvSpPr>
+          <p:cNvPr id="7" name="Slide Number Placeholder 6"/>
+          <p:cNvSpPr>
+            <a:spLocks noGrp="1"/>
+          </p:cNvSpPr>
+          <p:nvPr>
+            <p:ph type="sldNum" sz="quarter" idx="5"/>
+          </p:nvPr>
+        </p:nvSpPr>
+        <p:spPr>
+          <a:xfrm>
+            <a:off x="3884613" y="8685213"/>
+            <a:ext cx="2971800" cy="458787"/>
+          </a:xfrm>
+          <a:prstGeom prst="rect">
+            <a:avLst/>
+          </a:prstGeom>
+        </p:spPr>
+        <p:txBody>
+          <a:bodyPr vert="horz" lIns="91440" tIns="45720" rIns="91440" bIns="45720" rtlCol="0" anchor="b"/>
+          <a:lstStyle>
+            <a:lvl1pPr algn="r">
+              <a:defRPr sz="1200"/>
+            </a:lvl1pPr>
+          </a:lstStyle>
+          <a:p>
+            <a:fld id="{D95A25E5-2A8B-4DE0-8544-9EEA272C2DE4}" type="slidenum">
+              <a:rPr lang="en-US" smtClean="0"/>
+              <a:t>‹#›</a:t>
+            </a:fld>
+            <a:endParaRPr lang="en-US"/>
+          </a:p>
+        </p:txBody>
+      </p:sp>
+    </p:spTree>
+    <p:extLst>
+      <p:ext uri="{BB962C8B-B14F-4D97-AF65-F5344CB8AC3E}">
+        <p14:creationId xmlns:p14="http://schemas.microsoft.com/office/powerpoint/2010/main" val="375975839"/>
+      </p:ext>
+    </p:extLst>
+  </p:cSld>
+  <p:clrMap bg1="lt1" tx1="dk1" bg2="lt2" tx2="dk2" accent1="accent1" accent2="accent2" accent3="accent3" accent4="accent4" accent5="accent5" accent6="accent6" hlink="hlink" folHlink="folHlink"/>
+  <p:notesStyle>
+    <a:lvl1pPr marL="0" algn="l" defTabSz="914400" rtl="0" eaLnBrk="1" latinLnBrk="0" hangingPunct="1">
+      <a:defRPr sz="1200" kern="1200">
+        <a:solidFill>
+          <a:schemeClr val="tx1"/>
+        </a:solidFill>
+        <a:latin typeface="+mn-lt"/>
+        <a:ea typeface="+mn-ea"/>
+        <a:cs typeface="+mn-cs"/>
+      </a:defRPr>
+    </a:lvl1pPr>
+    <a:lvl2pPr marL="457200" algn="l" defTabSz="914400" rtl="0" eaLnBrk="1" latinLnBrk="0" hangingPunct="1">
+      <a:defRPr sz="1200" kern="1200">
+        <a:solidFill>
+          <a:schemeClr val="tx1"/>
+        </a:solidFill>
+        <a:latin typeface="+mn-lt"/>
+        <a:ea typeface="+mn-ea"/>
+        <a:cs typeface="+mn-cs"/>
+      </a:defRPr>
+    </a:lvl2pPr>
+    <a:lvl3pPr marL="914400" algn="l" defTabSz="914400" rtl="0" eaLnBrk="1" latinLnBrk="0" hangingPunct="1">
+      <a:defRPr sz="1200" kern="1200">
+        <a:solidFill>
+          <a:schemeClr val="tx1"/>
+        </a:solidFill>
+        <a:latin typeface="+mn-lt"/>
+        <a:ea typeface="+mn-ea"/>
+        <a:cs typeface="+mn-cs"/>
+      </a:defRPr>
+    </a:lvl3pPr>
+    <a:lvl4pPr marL="1371600" algn="l" defTabSz="914400" rtl="0" eaLnBrk="1" latinLnBrk="0" hangingPunct="1">
+      <a:defRPr sz="1200" kern="1200">
+        <a:solidFill>
+          <a:schemeClr val="tx1"/>
+        </a:solidFill>
+        <a:latin typeface="+mn-lt"/>
+        <a:ea typeface="+mn-ea"/>
+        <a:cs typeface="+mn-cs"/>
+      </a:defRPr>
+    </a:lvl4pPr>
+    <a:lvl5pPr marL="1828800" algn="l" defTabSz="914400" rtl="0" eaLnBrk="1" latinLnBrk="0" hangingPunct="1">
+      <a:defRPr sz="1200" kern="1200">
+        <a:solidFill>
+          <a:schemeClr val="tx1"/>
+        </a:solidFill>
+        <a:latin typeface="+mn-lt"/>
+        <a:ea typeface="+mn-ea"/>
+        <a:cs typeface="+mn-cs"/>
+      </a:defRPr>
+    </a:lvl5pPr>
+    <a:lvl6pPr marL="2286000" algn="l" defTabSz="914400" rtl="0" eaLnBrk="1" latinLnBrk="0" hangingPunct="1">
+      <a:defRPr sz="1200" kern="1200">
+        <a:solidFill>
+          <a:schemeClr val="tx1"/>
+        </a:solidFill>
+        <a:latin typeface="+mn-lt"/>
+        <a:ea typeface="+mn-ea"/>
+        <a:cs typeface="+mn-cs"/>
+      </a:defRPr>
+    </a:lvl6pPr>
+    <a:lvl7pPr marL="2743200" algn="l" defTabSz="914400" rtl="0" eaLnBrk="1" latinLnBrk="0" hangingPunct="1">
+      <a:defRPr sz="1200" kern="1200">
+        <a:solidFill>
+          <a:schemeClr val="tx1"/>
+        </a:solidFill>
+        <a:latin typeface="+mn-lt"/>
+        <a:ea typeface="+mn-ea"/>
+        <a:cs typeface="+mn-cs"/>
+      </a:defRPr>
+    </a:lvl7pPr>
+    <a:lvl8pPr marL="3200400" algn="l" defTabSz="914400" rtl="0" eaLnBrk="1" latinLnBrk="0" hangingPunct="1">
+      <a:defRPr sz="1200" kern="1200">
+        <a:solidFill>
+          <a:schemeClr val="tx1"/>
+        </a:solidFill>
+        <a:latin typeface="+mn-lt"/>
+        <a:ea typeface="+mn-ea"/>
+        <a:cs typeface="+mn-cs"/>
+      </a:defRPr>
+    </a:lvl8pPr>
+    <a:lvl9pPr marL="3657600" algn="l" defTabSz="914400" rtl="0" eaLnBrk="1" latinLnBrk="0" hangingPunct="1">
+      <a:defRPr sz="1200" kern="1200">
+        <a:solidFill>
+          <a:schemeClr val="tx1"/>
+        </a:solidFill>
+        <a:latin typeface="+mn-lt"/>
+        <a:ea typeface="+mn-ea"/>
+        <a:cs typeface="+mn-cs"/>
+      </a:defRPr>
+    </a:lvl9pPr>
+  </p:notesStyle>
+</p:notesMaster>
+</file>
+
+<file path=ppt/notesSlides/notesSlide1.xml><?xml version="1.0" encoding="utf-8"?>
+<p:notes xmlns:a="http://schemas.openxmlformats.org/drawingml/2006/main" xmlns:r="http://schemas.openxmlformats.org/officeDocument/2006/relationships" xmlns:p="http://schemas.openxmlformats.org/presentationml/2006/main">
+  <p:cSld>
+    <p:spTree>
+      <p:nvGrpSpPr>
+        <p:cNvPr id="1" name=""/>
+        <p:cNvGrpSpPr/>
+        <p:nvPr/>
+      </p:nvGrpSpPr>
+      <p:grpSpPr>
+        <a:xfrm>
+          <a:off x="0" y="0"/>
+          <a:ext cx="0" cy="0"/>
+          <a:chOff x="0" y="0"/>
+          <a:chExt cx="0" cy="0"/>
+        </a:xfrm>
+      </p:grpSpPr>
+      <p:sp>
+        <p:nvSpPr>
+          <p:cNvPr id="2" name="Slide Image Placeholder 1"/>
+          <p:cNvSpPr>
+            <a:spLocks noGrp="1" noRot="1" noChangeAspect="1"/>
+          </p:cNvSpPr>
+          <p:nvPr>
+            <p:ph type="sldImg"/>
+          </p:nvPr>
+        </p:nvSpPr>
+        <p:spPr/>
+      </p:sp>
+      <p:sp>
+        <p:nvSpPr>
+          <p:cNvPr id="3" name="Notes Placeholder 2"/>
+          <p:cNvSpPr>
+            <a:spLocks noGrp="1"/>
+          </p:cNvSpPr>
+          <p:nvPr>
+            <p:ph type="body" idx="1"/>
+          </p:nvPr>
+        </p:nvSpPr>
+        <p:spPr/>
+        <p:txBody>
+          <a:bodyPr/>
+          <a:lstStyle/>
+          <a:p>
+            <a:r>
+              <a:rPr lang="en-US" dirty="0"/>
+              <a:t>My report looks into division in current politics as reflected in Congress and its membership bodies. There is a large history of media and publications on the topic from purple composition of constituent districts to analysis on political extremism. The goal for this report will be to validate some existing points of similar research to create a Congress-to-Citizen proxy analysis baseline for future analysis.</a:t>
+            </a:r>
+          </a:p>
+        </p:txBody>
+      </p:sp>
+      <p:sp>
+        <p:nvSpPr>
+          <p:cNvPr id="4" name="Slide Number Placeholder 3"/>
+          <p:cNvSpPr>
+            <a:spLocks noGrp="1"/>
+          </p:cNvSpPr>
+          <p:nvPr>
+            <p:ph type="sldNum" sz="quarter" idx="5"/>
+          </p:nvPr>
+        </p:nvSpPr>
+        <p:spPr/>
+        <p:txBody>
+          <a:bodyPr/>
+          <a:lstStyle/>
+          <a:p>
+            <a:fld id="{D95A25E5-2A8B-4DE0-8544-9EEA272C2DE4}" type="slidenum">
+              <a:rPr lang="en-US" smtClean="0"/>
+              <a:t>2</a:t>
+            </a:fld>
+            <a:endParaRPr lang="en-US"/>
+          </a:p>
+        </p:txBody>
+      </p:sp>
+    </p:spTree>
+    <p:extLst>
+      <p:ext uri="{BB962C8B-B14F-4D97-AF65-F5344CB8AC3E}">
+        <p14:creationId xmlns:p14="http://schemas.microsoft.com/office/powerpoint/2010/main" val="1509338340"/>
+      </p:ext>
+    </p:extLst>
+  </p:cSld>
+  <p:clrMapOvr>
+    <a:masterClrMapping/>
+  </p:clrMapOvr>
+</p:notes>
+</file>
+
+<file path=ppt/notesSlides/notesSlide2.xml><?xml version="1.0" encoding="utf-8"?>
+<p:notes xmlns:a="http://schemas.openxmlformats.org/drawingml/2006/main" xmlns:r="http://schemas.openxmlformats.org/officeDocument/2006/relationships" xmlns:p="http://schemas.openxmlformats.org/presentationml/2006/main">
+  <p:cSld>
+    <p:spTree>
+      <p:nvGrpSpPr>
+        <p:cNvPr id="1" name=""/>
+        <p:cNvGrpSpPr/>
+        <p:nvPr/>
+      </p:nvGrpSpPr>
+      <p:grpSpPr>
+        <a:xfrm>
+          <a:off x="0" y="0"/>
+          <a:ext cx="0" cy="0"/>
+          <a:chOff x="0" y="0"/>
+          <a:chExt cx="0" cy="0"/>
+        </a:xfrm>
+      </p:grpSpPr>
+      <p:sp>
+        <p:nvSpPr>
+          <p:cNvPr id="2" name="Slide Image Placeholder 1"/>
+          <p:cNvSpPr>
+            <a:spLocks noGrp="1" noRot="1" noChangeAspect="1"/>
+          </p:cNvSpPr>
+          <p:nvPr>
+            <p:ph type="sldImg"/>
+          </p:nvPr>
+        </p:nvSpPr>
+        <p:spPr/>
+      </p:sp>
+      <p:sp>
+        <p:nvSpPr>
+          <p:cNvPr id="3" name="Notes Placeholder 2"/>
+          <p:cNvSpPr>
+            <a:spLocks noGrp="1"/>
+          </p:cNvSpPr>
+          <p:nvPr>
+            <p:ph type="body" idx="1"/>
+          </p:nvPr>
+        </p:nvSpPr>
+        <p:spPr/>
+        <p:txBody>
+          <a:bodyPr/>
+          <a:lstStyle/>
+          <a:p>
+            <a:r>
+              <a:rPr lang="en-US" dirty="0" err="1"/>
+              <a:t>VoteView</a:t>
+            </a:r>
+            <a:r>
+              <a:rPr lang="en-US" dirty="0"/>
+              <a:t> provides our Congressional and Membership voting history and ideology (by Keith Pool &amp; Howard Rosenthal). It has been in use since 1992 and is considered the de facto source of Congressional actions and votes. Supplemental data is collated from across the web to provide information about Presidential timelines, major US incidents, and global socio-</a:t>
+            </a:r>
+            <a:r>
+              <a:rPr lang="en-US" dirty="0" err="1"/>
+              <a:t>ecominic</a:t>
+            </a:r>
+            <a:r>
+              <a:rPr lang="en-US" dirty="0"/>
+              <a:t> events.</a:t>
+            </a:r>
+          </a:p>
+        </p:txBody>
+      </p:sp>
+      <p:sp>
+        <p:nvSpPr>
+          <p:cNvPr id="4" name="Slide Number Placeholder 3"/>
+          <p:cNvSpPr>
+            <a:spLocks noGrp="1"/>
+          </p:cNvSpPr>
+          <p:nvPr>
+            <p:ph type="sldNum" sz="quarter" idx="5"/>
+          </p:nvPr>
+        </p:nvSpPr>
+        <p:spPr/>
+        <p:txBody>
+          <a:bodyPr/>
+          <a:lstStyle/>
+          <a:p>
+            <a:fld id="{D95A25E5-2A8B-4DE0-8544-9EEA272C2DE4}" type="slidenum">
+              <a:rPr lang="en-US" smtClean="0"/>
+              <a:t>3</a:t>
+            </a:fld>
+            <a:endParaRPr lang="en-US"/>
+          </a:p>
+        </p:txBody>
+      </p:sp>
+    </p:spTree>
+    <p:extLst>
+      <p:ext uri="{BB962C8B-B14F-4D97-AF65-F5344CB8AC3E}">
+        <p14:creationId xmlns:p14="http://schemas.microsoft.com/office/powerpoint/2010/main" val="1973236283"/>
+      </p:ext>
+    </p:extLst>
+  </p:cSld>
+  <p:clrMapOvr>
+    <a:masterClrMapping/>
+  </p:clrMapOvr>
+</p:notes>
+</file>
+
+<file path=ppt/notesSlides/notesSlide3.xml><?xml version="1.0" encoding="utf-8"?>
+<p:notes xmlns:a="http://schemas.openxmlformats.org/drawingml/2006/main" xmlns:r="http://schemas.openxmlformats.org/officeDocument/2006/relationships" xmlns:p="http://schemas.openxmlformats.org/presentationml/2006/main">
+  <p:cSld>
+    <p:spTree>
+      <p:nvGrpSpPr>
+        <p:cNvPr id="1" name=""/>
+        <p:cNvGrpSpPr/>
+        <p:nvPr/>
+      </p:nvGrpSpPr>
+      <p:grpSpPr>
+        <a:xfrm>
+          <a:off x="0" y="0"/>
+          <a:ext cx="0" cy="0"/>
+          <a:chOff x="0" y="0"/>
+          <a:chExt cx="0" cy="0"/>
+        </a:xfrm>
+      </p:grpSpPr>
+      <p:sp>
+        <p:nvSpPr>
+          <p:cNvPr id="2" name="Slide Image Placeholder 1"/>
+          <p:cNvSpPr>
+            <a:spLocks noGrp="1" noRot="1" noChangeAspect="1"/>
+          </p:cNvSpPr>
+          <p:nvPr>
+            <p:ph type="sldImg"/>
+          </p:nvPr>
+        </p:nvSpPr>
+        <p:spPr/>
+      </p:sp>
+      <p:sp>
+        <p:nvSpPr>
+          <p:cNvPr id="3" name="Notes Placeholder 2"/>
+          <p:cNvSpPr>
+            <a:spLocks noGrp="1"/>
+          </p:cNvSpPr>
+          <p:nvPr>
+            <p:ph type="body" idx="1"/>
+          </p:nvPr>
+        </p:nvSpPr>
+        <p:spPr/>
+        <p:txBody>
+          <a:bodyPr/>
+          <a:lstStyle/>
+          <a:p>
+            <a:r>
+              <a:rPr lang="en-US" dirty="0"/>
+              <a:t>I will be analyzing the data from three facets. The first test is to determine the consistent and growing existence of polarization in Congress with the second test to determine if the polarization is equally represented in each body and strata within Congress. The third phase is to attempt a voting prediction model for the delegates.</a:t>
+            </a:r>
+          </a:p>
+        </p:txBody>
+      </p:sp>
+      <p:sp>
+        <p:nvSpPr>
+          <p:cNvPr id="4" name="Slide Number Placeholder 3"/>
+          <p:cNvSpPr>
+            <a:spLocks noGrp="1"/>
+          </p:cNvSpPr>
+          <p:nvPr>
+            <p:ph type="sldNum" sz="quarter" idx="5"/>
+          </p:nvPr>
+        </p:nvSpPr>
+        <p:spPr/>
+        <p:txBody>
+          <a:bodyPr/>
+          <a:lstStyle/>
+          <a:p>
+            <a:fld id="{D95A25E5-2A8B-4DE0-8544-9EEA272C2DE4}" type="slidenum">
+              <a:rPr lang="en-US" smtClean="0"/>
+              <a:t>4</a:t>
+            </a:fld>
+            <a:endParaRPr lang="en-US"/>
+          </a:p>
+        </p:txBody>
+      </p:sp>
+    </p:spTree>
+    <p:extLst>
+      <p:ext uri="{BB962C8B-B14F-4D97-AF65-F5344CB8AC3E}">
+        <p14:creationId xmlns:p14="http://schemas.microsoft.com/office/powerpoint/2010/main" val="2575694236"/>
+      </p:ext>
+    </p:extLst>
+  </p:cSld>
+  <p:clrMapOvr>
+    <a:masterClrMapping/>
+  </p:clrMapOvr>
+</p:notes>
+</file>
+
+<file path=ppt/notesSlides/notesSlide4.xml><?xml version="1.0" encoding="utf-8"?>
+<p:notes xmlns:a="http://schemas.openxmlformats.org/drawingml/2006/main" xmlns:r="http://schemas.openxmlformats.org/officeDocument/2006/relationships" xmlns:p="http://schemas.openxmlformats.org/presentationml/2006/main">
+  <p:cSld>
+    <p:spTree>
+      <p:nvGrpSpPr>
+        <p:cNvPr id="1" name=""/>
+        <p:cNvGrpSpPr/>
+        <p:nvPr/>
+      </p:nvGrpSpPr>
+      <p:grpSpPr>
+        <a:xfrm>
+          <a:off x="0" y="0"/>
+          <a:ext cx="0" cy="0"/>
+          <a:chOff x="0" y="0"/>
+          <a:chExt cx="0" cy="0"/>
+        </a:xfrm>
+      </p:grpSpPr>
+      <p:sp>
+        <p:nvSpPr>
+          <p:cNvPr id="2" name="Slide Image Placeholder 1"/>
+          <p:cNvSpPr>
+            <a:spLocks noGrp="1" noRot="1" noChangeAspect="1"/>
+          </p:cNvSpPr>
+          <p:nvPr>
+            <p:ph type="sldImg"/>
+          </p:nvPr>
+        </p:nvSpPr>
+        <p:spPr/>
+      </p:sp>
+      <p:sp>
+        <p:nvSpPr>
+          <p:cNvPr id="3" name="Notes Placeholder 2"/>
+          <p:cNvSpPr>
+            <a:spLocks noGrp="1"/>
+          </p:cNvSpPr>
+          <p:nvPr>
+            <p:ph type="body" idx="1"/>
+          </p:nvPr>
+        </p:nvSpPr>
+        <p:spPr/>
+        <p:txBody>
+          <a:bodyPr/>
+          <a:lstStyle/>
+          <a:p>
+            <a:r>
+              <a:rPr lang="en-US" dirty="0"/>
+              <a:t>I will make no assumptions of the data and not consider any other published methodologies as a baseline for analysis. When possible, results will be tested with multiple methods for inter-model comparison.</a:t>
+            </a:r>
+          </a:p>
+        </p:txBody>
+      </p:sp>
+      <p:sp>
+        <p:nvSpPr>
+          <p:cNvPr id="4" name="Slide Number Placeholder 3"/>
+          <p:cNvSpPr>
+            <a:spLocks noGrp="1"/>
+          </p:cNvSpPr>
+          <p:nvPr>
+            <p:ph type="sldNum" sz="quarter" idx="5"/>
+          </p:nvPr>
+        </p:nvSpPr>
+        <p:spPr/>
+        <p:txBody>
+          <a:bodyPr/>
+          <a:lstStyle/>
+          <a:p>
+            <a:fld id="{D95A25E5-2A8B-4DE0-8544-9EEA272C2DE4}" type="slidenum">
+              <a:rPr lang="en-US" smtClean="0"/>
+              <a:t>5</a:t>
+            </a:fld>
+            <a:endParaRPr lang="en-US"/>
+          </a:p>
+        </p:txBody>
+      </p:sp>
+    </p:spTree>
+    <p:extLst>
+      <p:ext uri="{BB962C8B-B14F-4D97-AF65-F5344CB8AC3E}">
+        <p14:creationId xmlns:p14="http://schemas.microsoft.com/office/powerpoint/2010/main" val="4159391936"/>
+      </p:ext>
+    </p:extLst>
+  </p:cSld>
+  <p:clrMapOvr>
+    <a:masterClrMapping/>
+  </p:clrMapOvr>
+</p:notes>
+</file>
+
+<file path=ppt/notesSlides/notesSlide5.xml><?xml version="1.0" encoding="utf-8"?>
+<p:notes xmlns:a="http://schemas.openxmlformats.org/drawingml/2006/main" xmlns:r="http://schemas.openxmlformats.org/officeDocument/2006/relationships" xmlns:p="http://schemas.openxmlformats.org/presentationml/2006/main">
+  <p:cSld>
+    <p:spTree>
+      <p:nvGrpSpPr>
+        <p:cNvPr id="1" name=""/>
+        <p:cNvGrpSpPr/>
+        <p:nvPr/>
+      </p:nvGrpSpPr>
+      <p:grpSpPr>
+        <a:xfrm>
+          <a:off x="0" y="0"/>
+          <a:ext cx="0" cy="0"/>
+          <a:chOff x="0" y="0"/>
+          <a:chExt cx="0" cy="0"/>
+        </a:xfrm>
+      </p:grpSpPr>
+      <p:sp>
+        <p:nvSpPr>
+          <p:cNvPr id="2" name="Slide Image Placeholder 1"/>
+          <p:cNvSpPr>
+            <a:spLocks noGrp="1" noRot="1" noChangeAspect="1"/>
+          </p:cNvSpPr>
+          <p:nvPr>
+            <p:ph type="sldImg"/>
+          </p:nvPr>
+        </p:nvSpPr>
+        <p:spPr/>
+      </p:sp>
+      <p:sp>
+        <p:nvSpPr>
+          <p:cNvPr id="3" name="Notes Placeholder 2"/>
+          <p:cNvSpPr>
+            <a:spLocks noGrp="1"/>
+          </p:cNvSpPr>
+          <p:nvPr>
+            <p:ph type="body" idx="1"/>
+          </p:nvPr>
+        </p:nvSpPr>
+        <p:spPr/>
+        <p:txBody>
+          <a:bodyPr/>
+          <a:lstStyle/>
+          <a:p>
+            <a:r>
+              <a:rPr lang="en-US" dirty="0"/>
+              <a:t>I expect the presence of polarity to begin in the 1970s as it aligns with findings of other publications and validates my methodology is aligned with others. I have also made assumptions that the overall Party controls its delegates to the point where no individual member of Congress deviates too far from the Party line.</a:t>
+            </a:r>
+          </a:p>
+        </p:txBody>
+      </p:sp>
+      <p:sp>
+        <p:nvSpPr>
+          <p:cNvPr id="4" name="Slide Number Placeholder 3"/>
+          <p:cNvSpPr>
+            <a:spLocks noGrp="1"/>
+          </p:cNvSpPr>
+          <p:nvPr>
+            <p:ph type="sldNum" sz="quarter" idx="5"/>
+          </p:nvPr>
+        </p:nvSpPr>
+        <p:spPr/>
+        <p:txBody>
+          <a:bodyPr/>
+          <a:lstStyle/>
+          <a:p>
+            <a:fld id="{D95A25E5-2A8B-4DE0-8544-9EEA272C2DE4}" type="slidenum">
+              <a:rPr lang="en-US" smtClean="0"/>
+              <a:t>6</a:t>
+            </a:fld>
+            <a:endParaRPr lang="en-US"/>
+          </a:p>
+        </p:txBody>
+      </p:sp>
+    </p:spTree>
+    <p:extLst>
+      <p:ext uri="{BB962C8B-B14F-4D97-AF65-F5344CB8AC3E}">
+        <p14:creationId xmlns:p14="http://schemas.microsoft.com/office/powerpoint/2010/main" val="3458116035"/>
+      </p:ext>
+    </p:extLst>
+  </p:cSld>
+  <p:clrMapOvr>
+    <a:masterClrMapping/>
+  </p:clrMapOvr>
+</p:notes>
+</file>
+
+<file path=ppt/notesSlides/notesSlide6.xml><?xml version="1.0" encoding="utf-8"?>
+<p:notes xmlns:a="http://schemas.openxmlformats.org/drawingml/2006/main" xmlns:r="http://schemas.openxmlformats.org/officeDocument/2006/relationships" xmlns:p="http://schemas.openxmlformats.org/presentationml/2006/main">
+  <p:cSld>
+    <p:spTree>
+      <p:nvGrpSpPr>
+        <p:cNvPr id="1" name=""/>
+        <p:cNvGrpSpPr/>
+        <p:nvPr/>
+      </p:nvGrpSpPr>
+      <p:grpSpPr>
+        <a:xfrm>
+          <a:off x="0" y="0"/>
+          <a:ext cx="0" cy="0"/>
+          <a:chOff x="0" y="0"/>
+          <a:chExt cx="0" cy="0"/>
+        </a:xfrm>
+      </p:grpSpPr>
+      <p:sp>
+        <p:nvSpPr>
+          <p:cNvPr id="2" name="Slide Image Placeholder 1"/>
+          <p:cNvSpPr>
+            <a:spLocks noGrp="1" noRot="1" noChangeAspect="1"/>
+          </p:cNvSpPr>
+          <p:nvPr>
+            <p:ph type="sldImg"/>
+          </p:nvPr>
+        </p:nvSpPr>
+        <p:spPr/>
+      </p:sp>
+      <p:sp>
+        <p:nvSpPr>
+          <p:cNvPr id="3" name="Notes Placeholder 2"/>
+          <p:cNvSpPr>
+            <a:spLocks noGrp="1"/>
+          </p:cNvSpPr>
+          <p:nvPr>
+            <p:ph type="body" idx="1"/>
+          </p:nvPr>
+        </p:nvSpPr>
+        <p:spPr/>
+        <p:txBody>
+          <a:bodyPr/>
+          <a:lstStyle/>
+          <a:p>
+            <a:r>
+              <a:rPr lang="en-US" dirty="0"/>
+              <a:t>This is a proxy analysis of Congress to its Constituents and it makes an assumption the actions of the Government align with the majority of the public. Our data source is strong but only considers a single facet of a larger sociological picture and may result is weak predictive modeling because of its narrow scope. Good descriptive and initial analysis here sets the foundation for a more robust modeling system with the hopes that it can shift to more advanced predictive and prescriptive uses.</a:t>
+            </a:r>
+          </a:p>
+        </p:txBody>
+      </p:sp>
+      <p:sp>
+        <p:nvSpPr>
+          <p:cNvPr id="4" name="Slide Number Placeholder 3"/>
+          <p:cNvSpPr>
+            <a:spLocks noGrp="1"/>
+          </p:cNvSpPr>
+          <p:nvPr>
+            <p:ph type="sldNum" sz="quarter" idx="5"/>
+          </p:nvPr>
+        </p:nvSpPr>
+        <p:spPr/>
+        <p:txBody>
+          <a:bodyPr/>
+          <a:lstStyle/>
+          <a:p>
+            <a:fld id="{D95A25E5-2A8B-4DE0-8544-9EEA272C2DE4}" type="slidenum">
+              <a:rPr lang="en-US" smtClean="0"/>
+              <a:t>7</a:t>
+            </a:fld>
+            <a:endParaRPr lang="en-US"/>
+          </a:p>
+        </p:txBody>
+      </p:sp>
+    </p:spTree>
+    <p:extLst>
+      <p:ext uri="{BB962C8B-B14F-4D97-AF65-F5344CB8AC3E}">
+        <p14:creationId xmlns:p14="http://schemas.microsoft.com/office/powerpoint/2010/main" val="3780601126"/>
+      </p:ext>
+    </p:extLst>
+  </p:cSld>
+  <p:clrMapOvr>
+    <a:masterClrMapping/>
+  </p:clrMapOvr>
+</p:notes>
+</file>
+
 <file path=ppt/slideLayouts/slideLayout1.xml><?xml version="1.0" encoding="utf-8"?>
 <p:sldLayout xmlns:a="http://schemas.openxmlformats.org/drawingml/2006/main" xmlns:r="http://schemas.openxmlformats.org/officeDocument/2006/relationships" xmlns:p="http://schemas.openxmlformats.org/presentationml/2006/main" type="title" preserve="1">
   <p:cSld name="Title Slide">
@@ -15084,7 +15975,7 @@
           <a:p>
             <a:fld id="{F88F3EB0-33A6-4112-AE7F-504D96C0F600}" type="datetimeFigureOut">
               <a:rPr lang="en-US" smtClean="0"/>
-              <a:t>2024-10-09</a:t>
+              <a:t>2024-10-14</a:t>
             </a:fld>
             <a:endParaRPr lang="en-US"/>
           </a:p>
@@ -15282,7 +16173,7 @@
           <a:p>
             <a:fld id="{F88F3EB0-33A6-4112-AE7F-504D96C0F600}" type="datetimeFigureOut">
               <a:rPr lang="en-US" smtClean="0"/>
-              <a:t>2024-10-09</a:t>
+              <a:t>2024-10-14</a:t>
             </a:fld>
             <a:endParaRPr lang="en-US"/>
           </a:p>
@@ -15490,7 +16381,7 @@
           <a:p>
             <a:fld id="{F88F3EB0-33A6-4112-AE7F-504D96C0F600}" type="datetimeFigureOut">
               <a:rPr lang="en-US" smtClean="0"/>
-              <a:t>2024-10-09</a:t>
+              <a:t>2024-10-14</a:t>
             </a:fld>
             <a:endParaRPr lang="en-US"/>
           </a:p>
@@ -15688,7 +16579,7 @@
           <a:p>
             <a:fld id="{F88F3EB0-33A6-4112-AE7F-504D96C0F600}" type="datetimeFigureOut">
               <a:rPr lang="en-US" smtClean="0"/>
-              <a:t>2024-10-09</a:t>
+              <a:t>2024-10-14</a:t>
             </a:fld>
             <a:endParaRPr lang="en-US"/>
           </a:p>
@@ -15963,7 +16854,7 @@
           <a:p>
             <a:fld id="{F88F3EB0-33A6-4112-AE7F-504D96C0F600}" type="datetimeFigureOut">
               <a:rPr lang="en-US" smtClean="0"/>
-              <a:t>2024-10-09</a:t>
+              <a:t>2024-10-14</a:t>
             </a:fld>
             <a:endParaRPr lang="en-US"/>
           </a:p>
@@ -16228,7 +17119,7 @@
           <a:p>
             <a:fld id="{F88F3EB0-33A6-4112-AE7F-504D96C0F600}" type="datetimeFigureOut">
               <a:rPr lang="en-US" smtClean="0"/>
-              <a:t>2024-10-09</a:t>
+              <a:t>2024-10-14</a:t>
             </a:fld>
             <a:endParaRPr lang="en-US"/>
           </a:p>
@@ -16640,7 +17531,7 @@
           <a:p>
             <a:fld id="{F88F3EB0-33A6-4112-AE7F-504D96C0F600}" type="datetimeFigureOut">
               <a:rPr lang="en-US" smtClean="0"/>
-              <a:t>2024-10-09</a:t>
+              <a:t>2024-10-14</a:t>
             </a:fld>
             <a:endParaRPr lang="en-US"/>
           </a:p>
@@ -16781,7 +17672,7 @@
           <a:p>
             <a:fld id="{F88F3EB0-33A6-4112-AE7F-504D96C0F600}" type="datetimeFigureOut">
               <a:rPr lang="en-US" smtClean="0"/>
-              <a:t>2024-10-09</a:t>
+              <a:t>2024-10-14</a:t>
             </a:fld>
             <a:endParaRPr lang="en-US"/>
           </a:p>
@@ -16894,7 +17785,7 @@
           <a:p>
             <a:fld id="{F88F3EB0-33A6-4112-AE7F-504D96C0F600}" type="datetimeFigureOut">
               <a:rPr lang="en-US" smtClean="0"/>
-              <a:t>2024-10-09</a:t>
+              <a:t>2024-10-14</a:t>
             </a:fld>
             <a:endParaRPr lang="en-US"/>
           </a:p>
@@ -17205,7 +18096,7 @@
           <a:p>
             <a:fld id="{F88F3EB0-33A6-4112-AE7F-504D96C0F600}" type="datetimeFigureOut">
               <a:rPr lang="en-US" smtClean="0"/>
-              <a:t>2024-10-09</a:t>
+              <a:t>2024-10-14</a:t>
             </a:fld>
             <a:endParaRPr lang="en-US"/>
           </a:p>
@@ -17493,7 +18384,7 @@
           <a:p>
             <a:fld id="{F88F3EB0-33A6-4112-AE7F-504D96C0F600}" type="datetimeFigureOut">
               <a:rPr lang="en-US" smtClean="0"/>
-              <a:t>2024-10-09</a:t>
+              <a:t>2024-10-14</a:t>
             </a:fld>
             <a:endParaRPr lang="en-US"/>
           </a:p>
@@ -17734,7 +18625,7 @@
           <a:p>
             <a:fld id="{F88F3EB0-33A6-4112-AE7F-504D96C0F600}" type="datetimeFigureOut">
               <a:rPr lang="en-US" smtClean="0"/>
-              <a:t>2024-10-09</a:t>
+              <a:t>2024-10-14</a:t>
             </a:fld>
             <a:endParaRPr lang="en-US"/>
           </a:p>
@@ -18374,7 +19265,7 @@
           <p:nvPr/>
         </p:nvPicPr>
         <p:blipFill>
-          <a:blip r:embed="rId2">
+          <a:blip r:embed="rId3">
             <a:clrChange>
               <a:clrFrom>
                 <a:srgbClr val="FFFFFF"/>
@@ -18390,7 +19281,7 @@
                 <a14:useLocalDpi xmlns:a14="http://schemas.microsoft.com/office/drawing/2010/main" val="0"/>
               </a:ext>
               <a:ext uri="{837473B0-CC2E-450A-ABE3-18F120FF3D39}">
-                <a1611:picAttrSrcUrl xmlns:a1611="http://schemas.microsoft.com/office/drawing/2016/11/main" r:id="rId3"/>
+                <a1611:picAttrSrcUrl xmlns:a1611="http://schemas.microsoft.com/office/drawing/2016/11/main" r:id="rId4"/>
               </a:ext>
             </a:extLst>
           </a:blip>
@@ -18465,7 +19356,7 @@
         </p:xfrm>
         <a:graphic>
           <a:graphicData uri="http://schemas.openxmlformats.org/drawingml/2006/diagram">
-            <dgm:relIds xmlns:dgm="http://schemas.openxmlformats.org/drawingml/2006/diagram" xmlns:r="http://schemas.openxmlformats.org/officeDocument/2006/relationships" r:dm="rId2" r:lo="rId3" r:qs="rId4" r:cs="rId5"/>
+            <dgm:relIds xmlns:dgm="http://schemas.openxmlformats.org/drawingml/2006/diagram" xmlns:r="http://schemas.openxmlformats.org/officeDocument/2006/relationships" r:dm="rId3" r:lo="rId4" r:qs="rId5" r:cs="rId6"/>
           </a:graphicData>
         </a:graphic>
       </p:graphicFrame>
@@ -18542,7 +19433,7 @@
             </a:r>
             <a:r>
               <a:rPr lang="en-US" dirty="0">
-                <a:hlinkClick r:id="rId7"/>
+                <a:hlinkClick r:id="rId8"/>
               </a:rPr>
               <a:t>VoteView.com</a:t>
             </a:r>
@@ -18577,13 +19468,13 @@
   <p:clrMapOvr>
     <a:masterClrMapping/>
   </p:clrMapOvr>
-  <mc:AlternateContent xmlns:mc="http://schemas.openxmlformats.org/markup-compatibility/2006">
-    <mc:Choice xmlns:p14="http://schemas.microsoft.com/office/powerpoint/2010/main" Requires="p14">
+  <mc:AlternateContent xmlns:mc="http://schemas.openxmlformats.org/markup-compatibility/2006" xmlns:p14="http://schemas.microsoft.com/office/powerpoint/2010/main">
+    <mc:Choice Requires="p14">
       <p:transition spd="med" p14:dur="700">
         <p:fade/>
       </p:transition>
     </mc:Choice>
-    <mc:Fallback>
+    <mc:Fallback xmlns="">
       <p:transition spd="med">
         <p:fade/>
       </p:transition>
@@ -18639,7 +19530,7 @@
         </p:xfrm>
         <a:graphic>
           <a:graphicData uri="http://schemas.openxmlformats.org/drawingml/2006/diagram">
-            <dgm:relIds xmlns:dgm="http://schemas.openxmlformats.org/drawingml/2006/diagram" xmlns:r="http://schemas.openxmlformats.org/officeDocument/2006/relationships" r:dm="rId2" r:lo="rId3" r:qs="rId4" r:cs="rId5"/>
+            <dgm:relIds xmlns:dgm="http://schemas.openxmlformats.org/drawingml/2006/diagram" xmlns:r="http://schemas.openxmlformats.org/officeDocument/2006/relationships" r:dm="rId3" r:lo="rId4" r:qs="rId5" r:cs="rId6"/>
           </a:graphicData>
         </a:graphic>
       </p:graphicFrame>
@@ -18693,7 +19584,7 @@
         <p:spPr>
           <a:xfrm>
             <a:off x="6096000" y="1609725"/>
-            <a:ext cx="5486398" cy="2308324"/>
+            <a:ext cx="5486398" cy="3693319"/>
           </a:xfrm>
           <a:prstGeom prst="rect">
             <a:avLst/>
@@ -18735,6 +19626,23 @@
             <a:r>
               <a:rPr lang="en-US" dirty="0"/>
               <a:t>Second Phase: Current polarization can be identified through each facet of Congressional body, Presidential administration, and neighboring Congressional sessions.</a:t>
+            </a:r>
+          </a:p>
+          <a:p>
+            <a:pPr marL="285750" indent="-285750">
+              <a:buFont typeface="Arial" panose="020B0604020202020204" pitchFamily="34" charset="0"/>
+              <a:buChar char="•"/>
+            </a:pPr>
+            <a:endParaRPr lang="en-US" dirty="0"/>
+          </a:p>
+          <a:p>
+            <a:pPr marL="285750" indent="-285750">
+              <a:buFont typeface="Arial" panose="020B0604020202020204" pitchFamily="34" charset="0"/>
+              <a:buChar char="•"/>
+            </a:pPr>
+            <a:r>
+              <a:rPr lang="en-US" dirty="0"/>
+              <a:t>Third Phase: Distill a predictor model to determine Congressional Member voting habits and prescribe Congressional outcomes given current Party compositions.</a:t>
             </a:r>
           </a:p>
         </p:txBody>
@@ -18802,7 +19710,7 @@
         </p:xfrm>
         <a:graphic>
           <a:graphicData uri="http://schemas.openxmlformats.org/drawingml/2006/diagram">
-            <dgm:relIds xmlns:dgm="http://schemas.openxmlformats.org/drawingml/2006/diagram" xmlns:r="http://schemas.openxmlformats.org/officeDocument/2006/relationships" r:dm="rId2" r:lo="rId3" r:qs="rId4" r:cs="rId5"/>
+            <dgm:relIds xmlns:dgm="http://schemas.openxmlformats.org/drawingml/2006/diagram" xmlns:r="http://schemas.openxmlformats.org/officeDocument/2006/relationships" r:dm="rId3" r:lo="rId4" r:qs="rId5" r:cs="rId6"/>
           </a:graphicData>
         </a:graphic>
       </p:graphicFrame>
@@ -18856,7 +19764,7 @@
         <p:spPr>
           <a:xfrm>
             <a:off x="6096000" y="1609725"/>
-            <a:ext cx="5486398" cy="2585323"/>
+            <a:ext cx="5486398" cy="1754326"/>
           </a:xfrm>
           <a:prstGeom prst="rect">
             <a:avLst/>
@@ -18910,23 +19818,6 @@
             <a:r>
               <a:rPr lang="en-US" dirty="0"/>
               <a:t>Validate segment results against similar analysis</a:t>
-            </a:r>
-          </a:p>
-          <a:p>
-            <a:pPr marL="285750" indent="-285750">
-              <a:buFont typeface="Arial" panose="020B0604020202020204" pitchFamily="34" charset="0"/>
-              <a:buChar char="•"/>
-            </a:pPr>
-            <a:endParaRPr lang="en-US" dirty="0"/>
-          </a:p>
-          <a:p>
-            <a:pPr marL="285750" indent="-285750">
-              <a:buFont typeface="Arial" panose="020B0604020202020204" pitchFamily="34" charset="0"/>
-              <a:buChar char="•"/>
-            </a:pPr>
-            <a:r>
-              <a:rPr lang="en-US" dirty="0"/>
-              <a:t>Determine feasibility of data use in voting prediction models</a:t>
             </a:r>
           </a:p>
         </p:txBody>
@@ -18994,7 +19885,7 @@
         </p:xfrm>
         <a:graphic>
           <a:graphicData uri="http://schemas.openxmlformats.org/drawingml/2006/diagram">
-            <dgm:relIds xmlns:dgm="http://schemas.openxmlformats.org/drawingml/2006/diagram" xmlns:r="http://schemas.openxmlformats.org/officeDocument/2006/relationships" r:dm="rId2" r:lo="rId3" r:qs="rId4" r:cs="rId5"/>
+            <dgm:relIds xmlns:dgm="http://schemas.openxmlformats.org/drawingml/2006/diagram" xmlns:r="http://schemas.openxmlformats.org/officeDocument/2006/relationships" r:dm="rId3" r:lo="rId4" r:qs="rId5" r:cs="rId6"/>
           </a:graphicData>
         </a:graphic>
       </p:graphicFrame>
@@ -19048,7 +19939,7 @@
         <p:spPr>
           <a:xfrm>
             <a:off x="6096000" y="1609725"/>
-            <a:ext cx="5486398" cy="2031325"/>
+            <a:ext cx="5486398" cy="2862322"/>
           </a:xfrm>
           <a:prstGeom prst="rect">
             <a:avLst/>
@@ -19102,6 +19993,23 @@
             <a:r>
               <a:rPr lang="en-US" dirty="0"/>
               <a:t>Member votes will align with Party regardless of Congressional disposition</a:t>
+            </a:r>
+          </a:p>
+          <a:p>
+            <a:pPr marL="285750" indent="-285750">
+              <a:buFont typeface="Arial" panose="020B0604020202020204" pitchFamily="34" charset="0"/>
+              <a:buChar char="•"/>
+            </a:pPr>
+            <a:endParaRPr lang="en-US" dirty="0"/>
+          </a:p>
+          <a:p>
+            <a:pPr marL="285750" indent="-285750">
+              <a:buFont typeface="Arial" panose="020B0604020202020204" pitchFamily="34" charset="0"/>
+              <a:buChar char="•"/>
+            </a:pPr>
+            <a:r>
+              <a:rPr lang="en-US" dirty="0"/>
+              <a:t>Voting prediction model will show high efficiency at member level but not at Party level.</a:t>
             </a:r>
           </a:p>
         </p:txBody>
@@ -19276,7 +20184,7 @@
           <p:nvPr/>
         </p:nvPicPr>
         <p:blipFill>
-          <a:blip r:embed="rId2">
+          <a:blip r:embed="rId3">
             <a:extLst>
               <a:ext uri="{28A0092B-C50C-407E-A947-70E740481C1C}">
                 <a14:useLocalDpi xmlns:a14="http://schemas.microsoft.com/office/drawing/2010/main" val="0"/>
@@ -19323,7 +20231,7 @@
           <p:nvPr/>
         </p:nvPicPr>
         <p:blipFill>
-          <a:blip r:embed="rId3">
+          <a:blip r:embed="rId4">
             <a:extLst>
               <a:ext uri="{28A0092B-C50C-407E-A947-70E740481C1C}">
                 <a14:useLocalDpi xmlns:a14="http://schemas.microsoft.com/office/drawing/2010/main" val="0"/>
@@ -19461,13 +20369,13 @@
   <p:clrMapOvr>
     <a:masterClrMapping/>
   </p:clrMapOvr>
-  <mc:AlternateContent xmlns:mc="http://schemas.openxmlformats.org/markup-compatibility/2006">
-    <mc:Choice xmlns:p14="http://schemas.microsoft.com/office/powerpoint/2010/main" Requires="p14">
+  <mc:AlternateContent xmlns:mc="http://schemas.openxmlformats.org/markup-compatibility/2006" xmlns:p14="http://schemas.microsoft.com/office/powerpoint/2010/main">
+    <mc:Choice Requires="p14">
       <p:transition spd="med" p14:dur="700">
         <p:fade/>
       </p:transition>
     </mc:Choice>
-    <mc:Fallback>
+    <mc:Fallback xmlns="">
       <p:transition spd="med">
         <p:fade/>
       </p:transition>
@@ -19769,4 +20677,299 @@
     </a:ext>
   </a:extLst>
 </a:theme>
+</file>
+
+<file path=ppt/theme/theme2.xml><?xml version="1.0" encoding="utf-8"?>
+<a:theme xmlns:a="http://schemas.openxmlformats.org/drawingml/2006/main" name="Office Theme">
+  <a:themeElements>
+    <a:clrScheme name="Office">
+      <a:dk1>
+        <a:sysClr val="windowText" lastClr="000000"/>
+      </a:dk1>
+      <a:lt1>
+        <a:sysClr val="window" lastClr="FFFFFF"/>
+      </a:lt1>
+      <a:dk2>
+        <a:srgbClr val="44546A"/>
+      </a:dk2>
+      <a:lt2>
+        <a:srgbClr val="E7E6E6"/>
+      </a:lt2>
+      <a:accent1>
+        <a:srgbClr val="4472C4"/>
+      </a:accent1>
+      <a:accent2>
+        <a:srgbClr val="ED7D31"/>
+      </a:accent2>
+      <a:accent3>
+        <a:srgbClr val="A5A5A5"/>
+      </a:accent3>
+      <a:accent4>
+        <a:srgbClr val="FFC000"/>
+      </a:accent4>
+      <a:accent5>
+        <a:srgbClr val="5B9BD5"/>
+      </a:accent5>
+      <a:accent6>
+        <a:srgbClr val="70AD47"/>
+      </a:accent6>
+      <a:hlink>
+        <a:srgbClr val="0563C1"/>
+      </a:hlink>
+      <a:folHlink>
+        <a:srgbClr val="954F72"/>
+      </a:folHlink>
+    </a:clrScheme>
+    <a:fontScheme name="Office">
+      <a:majorFont>
+        <a:latin typeface="Calibri Light" panose="020F0302020204030204"/>
+        <a:ea typeface=""/>
+        <a:cs typeface=""/>
+        <a:font script="Jpan" typeface="游ゴシック Light"/>
+        <a:font script="Hang" typeface="맑은 고딕"/>
+        <a:font script="Hans" typeface="等线 Light"/>
+        <a:font script="Hant" typeface="新細明體"/>
+        <a:font script="Arab" typeface="Times New Roman"/>
+        <a:font script="Hebr" typeface="Times New Roman"/>
+        <a:font script="Thai" typeface="Angsana New"/>
+        <a:font script="Ethi" typeface="Nyala"/>
+        <a:font script="Beng" typeface="Vrinda"/>
+        <a:font script="Gujr" typeface="Shruti"/>
+        <a:font script="Khmr" typeface="MoolBoran"/>
+        <a:font script="Knda" typeface="Tunga"/>
+        <a:font script="Guru" typeface="Raavi"/>
+        <a:font script="Cans" typeface="Euphemia"/>
+        <a:font script="Cher" typeface="Plantagenet Cherokee"/>
+        <a:font script="Yiii" typeface="Microsoft Yi Baiti"/>
+        <a:font script="Tibt" typeface="Microsoft Himalaya"/>
+        <a:font script="Thaa" typeface="MV Boli"/>
+        <a:font script="Deva" typeface="Mangal"/>
+        <a:font script="Telu" typeface="Gautami"/>
+        <a:font script="Taml" typeface="Latha"/>
+        <a:font script="Syrc" typeface="Estrangelo Edessa"/>
+        <a:font script="Orya" typeface="Kalinga"/>
+        <a:font script="Mlym" typeface="Kartika"/>
+        <a:font script="Laoo" typeface="DokChampa"/>
+        <a:font script="Sinh" typeface="Iskoola Pota"/>
+        <a:font script="Mong" typeface="Mongolian Baiti"/>
+        <a:font script="Viet" typeface="Times New Roman"/>
+        <a:font script="Uigh" typeface="Microsoft Uighur"/>
+        <a:font script="Geor" typeface="Sylfaen"/>
+        <a:font script="Armn" typeface="Arial"/>
+        <a:font script="Bugi" typeface="Leelawadee UI"/>
+        <a:font script="Bopo" typeface="Microsoft JhengHei"/>
+        <a:font script="Java" typeface="Javanese Text"/>
+        <a:font script="Lisu" typeface="Segoe UI"/>
+        <a:font script="Mymr" typeface="Myanmar Text"/>
+        <a:font script="Nkoo" typeface="Ebrima"/>
+        <a:font script="Olck" typeface="Nirmala UI"/>
+        <a:font script="Osma" typeface="Ebrima"/>
+        <a:font script="Phag" typeface="Phagspa"/>
+        <a:font script="Syrn" typeface="Estrangelo Edessa"/>
+        <a:font script="Syrj" typeface="Estrangelo Edessa"/>
+        <a:font script="Syre" typeface="Estrangelo Edessa"/>
+        <a:font script="Sora" typeface="Nirmala UI"/>
+        <a:font script="Tale" typeface="Microsoft Tai Le"/>
+        <a:font script="Talu" typeface="Microsoft New Tai Lue"/>
+        <a:font script="Tfng" typeface="Ebrima"/>
+      </a:majorFont>
+      <a:minorFont>
+        <a:latin typeface="Calibri" panose="020F0502020204030204"/>
+        <a:ea typeface=""/>
+        <a:cs typeface=""/>
+        <a:font script="Jpan" typeface="游ゴシック"/>
+        <a:font script="Hang" typeface="맑은 고딕"/>
+        <a:font script="Hans" typeface="等线"/>
+        <a:font script="Hant" typeface="新細明體"/>
+        <a:font script="Arab" typeface="Arial"/>
+        <a:font script="Hebr" typeface="Arial"/>
+        <a:font script="Thai" typeface="Cordia New"/>
+        <a:font script="Ethi" typeface="Nyala"/>
+        <a:font script="Beng" typeface="Vrinda"/>
+        <a:font script="Gujr" typeface="Shruti"/>
+        <a:font script="Khmr" typeface="DaunPenh"/>
+        <a:font script="Knda" typeface="Tunga"/>
+        <a:font script="Guru" typeface="Raavi"/>
+        <a:font script="Cans" typeface="Euphemia"/>
+        <a:font script="Cher" typeface="Plantagenet Cherokee"/>
+        <a:font script="Yiii" typeface="Microsoft Yi Baiti"/>
+        <a:font script="Tibt" typeface="Microsoft Himalaya"/>
+        <a:font script="Thaa" typeface="MV Boli"/>
+        <a:font script="Deva" typeface="Mangal"/>
+        <a:font script="Telu" typeface="Gautami"/>
+        <a:font script="Taml" typeface="Latha"/>
+        <a:font script="Syrc" typeface="Estrangelo Edessa"/>
+        <a:font script="Orya" typeface="Kalinga"/>
+        <a:font script="Mlym" typeface="Kartika"/>
+        <a:font script="Laoo" typeface="DokChampa"/>
+        <a:font script="Sinh" typeface="Iskoola Pota"/>
+        <a:font script="Mong" typeface="Mongolian Baiti"/>
+        <a:font script="Viet" typeface="Arial"/>
+        <a:font script="Uigh" typeface="Microsoft Uighur"/>
+        <a:font script="Geor" typeface="Sylfaen"/>
+        <a:font script="Armn" typeface="Arial"/>
+        <a:font script="Bugi" typeface="Leelawadee UI"/>
+        <a:font script="Bopo" typeface="Microsoft JhengHei"/>
+        <a:font script="Java" typeface="Javanese Text"/>
+        <a:font script="Lisu" typeface="Segoe UI"/>
+        <a:font script="Mymr" typeface="Myanmar Text"/>
+        <a:font script="Nkoo" typeface="Ebrima"/>
+        <a:font script="Olck" typeface="Nirmala UI"/>
+        <a:font script="Osma" typeface="Ebrima"/>
+        <a:font script="Phag" typeface="Phagspa"/>
+        <a:font script="Syrn" typeface="Estrangelo Edessa"/>
+        <a:font script="Syrj" typeface="Estrangelo Edessa"/>
+        <a:font script="Syre" typeface="Estrangelo Edessa"/>
+        <a:font script="Sora" typeface="Nirmala UI"/>
+        <a:font script="Tale" typeface="Microsoft Tai Le"/>
+        <a:font script="Talu" typeface="Microsoft New Tai Lue"/>
+        <a:font script="Tfng" typeface="Ebrima"/>
+      </a:minorFont>
+    </a:fontScheme>
+    <a:fmtScheme name="Office">
+      <a:fillStyleLst>
+        <a:solidFill>
+          <a:schemeClr val="phClr"/>
+        </a:solidFill>
+        <a:gradFill rotWithShape="1">
+          <a:gsLst>
+            <a:gs pos="0">
+              <a:schemeClr val="phClr">
+                <a:lumMod val="110000"/>
+                <a:satMod val="105000"/>
+                <a:tint val="67000"/>
+              </a:schemeClr>
+            </a:gs>
+            <a:gs pos="50000">
+              <a:schemeClr val="phClr">
+                <a:lumMod val="105000"/>
+                <a:satMod val="103000"/>
+                <a:tint val="73000"/>
+              </a:schemeClr>
+            </a:gs>
+            <a:gs pos="100000">
+              <a:schemeClr val="phClr">
+                <a:lumMod val="105000"/>
+                <a:satMod val="109000"/>
+                <a:tint val="81000"/>
+              </a:schemeClr>
+            </a:gs>
+          </a:gsLst>
+          <a:lin ang="5400000" scaled="0"/>
+        </a:gradFill>
+        <a:gradFill rotWithShape="1">
+          <a:gsLst>
+            <a:gs pos="0">
+              <a:schemeClr val="phClr">
+                <a:satMod val="103000"/>
+                <a:lumMod val="102000"/>
+                <a:tint val="94000"/>
+              </a:schemeClr>
+            </a:gs>
+            <a:gs pos="50000">
+              <a:schemeClr val="phClr">
+                <a:satMod val="110000"/>
+                <a:lumMod val="100000"/>
+                <a:shade val="100000"/>
+              </a:schemeClr>
+            </a:gs>
+            <a:gs pos="100000">
+              <a:schemeClr val="phClr">
+                <a:lumMod val="99000"/>
+                <a:satMod val="120000"/>
+                <a:shade val="78000"/>
+              </a:schemeClr>
+            </a:gs>
+          </a:gsLst>
+          <a:lin ang="5400000" scaled="0"/>
+        </a:gradFill>
+      </a:fillStyleLst>
+      <a:lnStyleLst>
+        <a:ln w="6350" cap="flat" cmpd="sng" algn="ctr">
+          <a:solidFill>
+            <a:schemeClr val="phClr"/>
+          </a:solidFill>
+          <a:prstDash val="solid"/>
+          <a:miter lim="800000"/>
+        </a:ln>
+        <a:ln w="12700" cap="flat" cmpd="sng" algn="ctr">
+          <a:solidFill>
+            <a:schemeClr val="phClr"/>
+          </a:solidFill>
+          <a:prstDash val="solid"/>
+          <a:miter lim="800000"/>
+        </a:ln>
+        <a:ln w="19050" cap="flat" cmpd="sng" algn="ctr">
+          <a:solidFill>
+            <a:schemeClr val="phClr"/>
+          </a:solidFill>
+          <a:prstDash val="solid"/>
+          <a:miter lim="800000"/>
+        </a:ln>
+      </a:lnStyleLst>
+      <a:effectStyleLst>
+        <a:effectStyle>
+          <a:effectLst/>
+        </a:effectStyle>
+        <a:effectStyle>
+          <a:effectLst/>
+        </a:effectStyle>
+        <a:effectStyle>
+          <a:effectLst>
+            <a:outerShdw blurRad="57150" dist="19050" dir="5400000" algn="ctr" rotWithShape="0">
+              <a:srgbClr val="000000">
+                <a:alpha val="63000"/>
+              </a:srgbClr>
+            </a:outerShdw>
+          </a:effectLst>
+        </a:effectStyle>
+      </a:effectStyleLst>
+      <a:bgFillStyleLst>
+        <a:solidFill>
+          <a:schemeClr val="phClr"/>
+        </a:solidFill>
+        <a:solidFill>
+          <a:schemeClr val="phClr">
+            <a:tint val="95000"/>
+            <a:satMod val="170000"/>
+          </a:schemeClr>
+        </a:solidFill>
+        <a:gradFill rotWithShape="1">
+          <a:gsLst>
+            <a:gs pos="0">
+              <a:schemeClr val="phClr">
+                <a:tint val="93000"/>
+                <a:satMod val="150000"/>
+                <a:shade val="98000"/>
+                <a:lumMod val="102000"/>
+              </a:schemeClr>
+            </a:gs>
+            <a:gs pos="50000">
+              <a:schemeClr val="phClr">
+                <a:tint val="98000"/>
+                <a:satMod val="130000"/>
+                <a:shade val="90000"/>
+                <a:lumMod val="103000"/>
+              </a:schemeClr>
+            </a:gs>
+            <a:gs pos="100000">
+              <a:schemeClr val="phClr">
+                <a:shade val="63000"/>
+                <a:satMod val="120000"/>
+              </a:schemeClr>
+            </a:gs>
+          </a:gsLst>
+          <a:lin ang="5400000" scaled="0"/>
+        </a:gradFill>
+      </a:bgFillStyleLst>
+    </a:fmtScheme>
+  </a:themeElements>
+  <a:objectDefaults/>
+  <a:extraClrSchemeLst/>
+  <a:extLst>
+    <a:ext uri="{05A4C25C-085E-4340-85A3-A5531E510DB2}">
+      <thm15:themeFamily xmlns:thm15="http://schemas.microsoft.com/office/thememl/2012/main" name="Office Theme" id="{62F939B6-93AF-4DB8-9C6B-D6C7DFDC589F}" vid="{4A3C46E8-61CC-4603-A589-7422A47A8E4A}"/>
+    </a:ext>
+  </a:extLst>
+</a:theme>
 </file>
</xml_diff>